<commit_message>
Update presentation; Rename files
</commit_message>
<xml_diff>
--- a/Presantation/CivicsPolitical Presentation 3.pptx
+++ b/Presantation/CivicsPolitical Presentation 3.pptx
@@ -276,6 +276,11 @@
       </a:defRPr>
     </a:lvl9pPr>
   </p:defaultTextStyle>
+  <p:extLst>
+    <p:ext uri="{EFAFB233-063F-42B5-8137-9DF3F51BA10A}">
+      <p15:sldGuideLst xmlns:p15="http://schemas.microsoft.com/office/powerpoint/2012/main"/>
+    </p:ext>
+  </p:extLst>
 </p:presentation>
 </file>
 
@@ -1422,7 +1427,7 @@
               <a:buNone/>
             </a:pPr>
             <a:r>
-              <a:rPr lang="en" sz="1200">
+              <a:rPr lang="en" sz="1200" dirty="0">
                 <a:solidFill>
                   <a:schemeClr val="dk1"/>
                 </a:solidFill>
@@ -1431,9 +1436,9 @@
                 <a:cs typeface="Nunito"/>
                 <a:sym typeface="Nunito"/>
               </a:rPr>
-              <a:t>The data set is divided then joined along the following parameters from the CSV:</a:t>
+              <a:t>The data set is divided into 5 CSV files and from each of them has been created a separate table in Postgres DB:</a:t>
             </a:r>
-            <a:endParaRPr sz="1200">
+            <a:endParaRPr sz="1200" dirty="0">
               <a:solidFill>
                 <a:schemeClr val="dk1"/>
               </a:solidFill>
@@ -1462,7 +1467,7 @@
               <a:buNone/>
             </a:pPr>
             <a:r>
-              <a:rPr lang="en" sz="1200">
+              <a:rPr lang="en-US" sz="1200" dirty="0">
                 <a:solidFill>
                   <a:schemeClr val="dk1"/>
                 </a:solidFill>
@@ -1471,9 +1476,21 @@
                 <a:cs typeface="Nunito"/>
                 <a:sym typeface="Nunito"/>
               </a:rPr>
-              <a:t>A-AV --&gt; Voter_information AC --&gt;AB-AC--&gt;Ideological Leaning E-T --&gt; Location_info/District_info U-AC--&gt;Ideological Information AW--&gt;Voter_opinion/choice BH-BK--&gt;Candidate_info</a:t>
+              <a:t>c</a:t>
             </a:r>
-            <a:endParaRPr sz="1200">
+            <a:r>
+              <a:rPr lang="en-US" sz="1200" b="1" dirty="0">
+                <a:solidFill>
+                  <a:schemeClr val="dk1"/>
+                </a:solidFill>
+                <a:latin typeface="Nunito"/>
+                <a:ea typeface="Nunito"/>
+                <a:cs typeface="Nunito"/>
+                <a:sym typeface="Nunito"/>
+              </a:rPr>
+              <a:t>andidate_info, district_info, ideological_leaning, voter_info, voter_choice</a:t>
+            </a:r>
+            <a:endParaRPr sz="1200" b="1" dirty="0">
               <a:solidFill>
                 <a:schemeClr val="dk1"/>
               </a:solidFill>
@@ -1485,43 +1502,15 @@
           </a:p>
           <a:p>
             <a:pPr marL="0" lvl="0" indent="0" algn="l" rtl="0">
-              <a:lnSpc>
-                <a:spcPct val="115000"/>
-              </a:lnSpc>
-              <a:spcBef>
-                <a:spcPts val="1200"/>
-              </a:spcBef>
-              <a:spcAft>
-                <a:spcPts val="0"/>
-              </a:spcAft>
-              <a:buClr>
-                <a:schemeClr val="dk1"/>
-              </a:buClr>
-              <a:buSzPts val="1100"/>
-              <a:buFont typeface="Arial"/>
+              <a:spcBef>
+                <a:spcPts val="0"/>
+              </a:spcBef>
+              <a:spcAft>
+                <a:spcPts val="0"/>
+              </a:spcAft>
               <a:buNone/>
             </a:pPr>
-            <a:endParaRPr sz="1200">
-              <a:solidFill>
-                <a:schemeClr val="dk1"/>
-              </a:solidFill>
-              <a:latin typeface="Nunito"/>
-              <a:ea typeface="Nunito"/>
-              <a:cs typeface="Nunito"/>
-              <a:sym typeface="Nunito"/>
-            </a:endParaRPr>
-          </a:p>
-          <a:p>
-            <a:pPr marL="0" lvl="0" indent="0" algn="l" rtl="0">
-              <a:spcBef>
-                <a:spcPts val="0"/>
-              </a:spcBef>
-              <a:spcAft>
-                <a:spcPts val="0"/>
-              </a:spcAft>
-              <a:buNone/>
-            </a:pPr>
-            <a:endParaRPr/>
+            <a:endParaRPr dirty="0"/>
           </a:p>
         </p:txBody>
       </p:sp>
@@ -48547,50 +48536,50 @@
               <a:buNone/>
             </a:pPr>
             <a:r>
-              <a:rPr lang="en" sz="1800"/>
+              <a:rPr lang="en" sz="1800" dirty="0"/>
               <a:t>In a </a:t>
             </a:r>
             <a:r>
-              <a:rPr lang="en" sz="1800" b="1"/>
+              <a:rPr lang="en" sz="1800" b="1" dirty="0"/>
               <a:t>politically polarized</a:t>
             </a:r>
             <a:r>
-              <a:rPr lang="en" sz="1800"/>
+              <a:rPr lang="en" sz="1800" dirty="0"/>
               <a:t> American society, </a:t>
             </a:r>
             <a:r>
-              <a:rPr lang="en" sz="1800" b="1"/>
+              <a:rPr lang="en" sz="1800" b="1" dirty="0"/>
               <a:t>understanding</a:t>
             </a:r>
             <a:r>
-              <a:rPr lang="en" sz="1800"/>
+              <a:rPr lang="en" sz="1800" dirty="0"/>
               <a:t> </a:t>
             </a:r>
             <a:r>
-              <a:rPr lang="en" sz="1800" b="1"/>
+              <a:rPr lang="en" sz="1800" b="1" dirty="0"/>
               <a:t>underlying drivers</a:t>
             </a:r>
             <a:r>
-              <a:rPr lang="en" sz="1800"/>
+              <a:rPr lang="en" sz="1800" dirty="0"/>
               <a:t> for political decisions may </a:t>
             </a:r>
             <a:r>
-              <a:rPr lang="en" sz="1800" b="1"/>
+              <a:rPr lang="en" sz="1800" b="1" dirty="0"/>
               <a:t>reduce existing tensions</a:t>
             </a:r>
             <a:r>
-              <a:rPr lang="en" sz="1800"/>
+              <a:rPr lang="en" sz="1800" dirty="0"/>
               <a:t> and contribute to a </a:t>
             </a:r>
             <a:r>
-              <a:rPr lang="en" sz="1800" b="1"/>
+              <a:rPr lang="en" sz="1800" b="1" dirty="0"/>
               <a:t>more balanced and cooperative political culture</a:t>
             </a:r>
             <a:r>
-              <a:rPr lang="en" sz="1800"/>
+              <a:rPr lang="en" sz="1800" dirty="0"/>
               <a:t>.</a:t>
             </a:r>
-            <a:endParaRPr sz="1800"/>
+            <a:endParaRPr sz="1800" dirty="0"/>
           </a:p>
           <a:p>
             <a:pPr marL="0" lvl="0" indent="0" algn="l" rtl="0">
@@ -48602,7 +48591,7 @@
               </a:spcAft>
               <a:buNone/>
             </a:pPr>
-            <a:endParaRPr sz="1200">
+            <a:endParaRPr sz="1200" dirty="0">
               <a:solidFill>
                 <a:srgbClr val="C9D1D9"/>
               </a:solidFill>
@@ -49798,71 +49787,6 @@
       </p:grpSpPr>
       <p:sp>
         <p:nvSpPr>
-          <p:cNvPr id="1257" name="Google Shape;1257;p39"/>
-          <p:cNvSpPr txBox="1">
-            <a:spLocks noGrp="1"/>
-          </p:cNvSpPr>
-          <p:nvPr>
-            <p:ph type="subTitle" idx="1"/>
-          </p:nvPr>
-        </p:nvSpPr>
-        <p:spPr>
-          <a:xfrm>
-            <a:off x="171000" y="2585950"/>
-            <a:ext cx="7186800" cy="1374900"/>
-          </a:xfrm>
-          <a:prstGeom prst="rect">
-            <a:avLst/>
-          </a:prstGeom>
-        </p:spPr>
-        <p:txBody>
-          <a:bodyPr spcFirstLastPara="1" wrap="square" lIns="91425" tIns="91425" rIns="91425" bIns="91425" anchor="t" anchorCtr="0">
-            <a:noAutofit/>
-          </a:bodyPr>
-          <a:lstStyle/>
-          <a:p>
-            <a:pPr marL="0" lvl="0" indent="0" algn="l" rtl="0">
-              <a:lnSpc>
-                <a:spcPct val="200000"/>
-              </a:lnSpc>
-              <a:spcBef>
-                <a:spcPts val="0"/>
-              </a:spcBef>
-              <a:spcAft>
-                <a:spcPts val="0"/>
-              </a:spcAft>
-              <a:buNone/>
-            </a:pPr>
-            <a:r>
-              <a:rPr lang="en">
-                <a:solidFill>
-                  <a:srgbClr val="191919"/>
-                </a:solidFill>
-              </a:rPr>
-              <a:t>A-AV --&gt; Voter_information AC --&gt;AB-AC--&gt;Ideological Leaning E-T --&gt; Location_info/District_info U-AC--&gt;Ideological Information AW--&gt;Voter_opinion/choice BH-BK--&gt;Candidate_info</a:t>
-            </a:r>
-            <a:endParaRPr>
-              <a:solidFill>
-                <a:srgbClr val="191919"/>
-              </a:solidFill>
-            </a:endParaRPr>
-          </a:p>
-          <a:p>
-            <a:pPr marL="0" lvl="0" indent="0" algn="l" rtl="0">
-              <a:spcBef>
-                <a:spcPts val="1600"/>
-              </a:spcBef>
-              <a:spcAft>
-                <a:spcPts val="1600"/>
-              </a:spcAft>
-              <a:buNone/>
-            </a:pPr>
-            <a:endParaRPr/>
-          </a:p>
-        </p:txBody>
-      </p:sp>
-      <p:sp>
-        <p:nvSpPr>
           <p:cNvPr id="1258" name="Google Shape;1258;p39">
             <a:hlinkClick r:id="" action="ppaction://hlinkshowjump?jump=nextslide"/>
           </p:cNvPr>
@@ -49953,8 +49877,8 @@
         </p:nvSpPr>
         <p:spPr>
           <a:xfrm>
-            <a:off x="720000" y="1507767"/>
-            <a:ext cx="7704000" cy="752400"/>
+            <a:off x="720000" y="1166995"/>
+            <a:ext cx="7704000" cy="462000"/>
           </a:xfrm>
           <a:prstGeom prst="rect">
             <a:avLst/>
@@ -49976,14 +49900,14 @@
               <a:buNone/>
             </a:pPr>
             <a:r>
-              <a:rPr lang="en">
+              <a:rPr lang="en" dirty="0">
                 <a:solidFill>
                   <a:schemeClr val="accent3"/>
                 </a:solidFill>
               </a:rPr>
               <a:t>METHODOLOGY - Data Exploration</a:t>
             </a:r>
-            <a:endParaRPr>
+            <a:endParaRPr dirty="0">
               <a:solidFill>
                 <a:schemeClr val="accent3"/>
               </a:solidFill>
@@ -49991,170 +49915,6 @@
           </a:p>
         </p:txBody>
       </p:sp>
-      <p:grpSp>
-        <p:nvGrpSpPr>
-          <p:cNvPr id="1261" name="Google Shape;1261;p39"/>
-          <p:cNvGrpSpPr/>
-          <p:nvPr/>
-        </p:nvGrpSpPr>
-        <p:grpSpPr>
-          <a:xfrm>
-            <a:off x="3867129" y="3862777"/>
-            <a:ext cx="3969455" cy="2733718"/>
-            <a:chOff x="5872100" y="2910900"/>
-            <a:chExt cx="2851825" cy="1990475"/>
-          </a:xfrm>
-        </p:grpSpPr>
-        <p:sp>
-          <p:nvSpPr>
-            <p:cNvPr id="1262" name="Google Shape;1262;p39"/>
-            <p:cNvSpPr/>
-            <p:nvPr/>
-          </p:nvSpPr>
-          <p:spPr>
-            <a:xfrm>
-              <a:off x="6160700" y="3191075"/>
-              <a:ext cx="2563200" cy="1710300"/>
-            </a:xfrm>
-            <a:prstGeom prst="rect">
-              <a:avLst/>
-            </a:prstGeom>
-            <a:noFill/>
-            <a:ln w="9525" cap="flat" cmpd="sng">
-              <a:solidFill>
-                <a:schemeClr val="accent6"/>
-              </a:solidFill>
-              <a:prstDash val="solid"/>
-              <a:round/>
-              <a:headEnd type="none" w="sm" len="sm"/>
-              <a:tailEnd type="none" w="sm" len="sm"/>
-            </a:ln>
-          </p:spPr>
-          <p:txBody>
-            <a:bodyPr spcFirstLastPara="1" wrap="square" lIns="91425" tIns="91425" rIns="91425" bIns="91425" anchor="ctr" anchorCtr="0">
-              <a:noAutofit/>
-            </a:bodyPr>
-            <a:lstStyle/>
-            <a:p>
-              <a:pPr marL="0" lvl="0" indent="0" algn="l" rtl="0">
-                <a:spcBef>
-                  <a:spcPts val="0"/>
-                </a:spcBef>
-                <a:spcAft>
-                  <a:spcPts val="0"/>
-                </a:spcAft>
-                <a:buNone/>
-              </a:pPr>
-              <a:endParaRPr/>
-            </a:p>
-          </p:txBody>
-        </p:sp>
-        <p:cxnSp>
-          <p:nvCxnSpPr>
-            <p:cNvPr id="1263" name="Google Shape;1263;p39"/>
-            <p:cNvCxnSpPr/>
-            <p:nvPr/>
-          </p:nvCxnSpPr>
-          <p:spPr>
-            <a:xfrm>
-              <a:off x="5872100" y="4616075"/>
-              <a:ext cx="288600" cy="285300"/>
-            </a:xfrm>
-            <a:prstGeom prst="straightConnector1">
-              <a:avLst/>
-            </a:prstGeom>
-            <a:noFill/>
-            <a:ln w="9525" cap="flat" cmpd="sng">
-              <a:solidFill>
-                <a:schemeClr val="accent6"/>
-              </a:solidFill>
-              <a:prstDash val="solid"/>
-              <a:round/>
-              <a:headEnd type="none" w="med" len="med"/>
-              <a:tailEnd type="none" w="med" len="med"/>
-            </a:ln>
-          </p:spPr>
-        </p:cxnSp>
-        <p:cxnSp>
-          <p:nvCxnSpPr>
-            <p:cNvPr id="1264" name="Google Shape;1264;p39"/>
-            <p:cNvCxnSpPr/>
-            <p:nvPr/>
-          </p:nvCxnSpPr>
-          <p:spPr>
-            <a:xfrm>
-              <a:off x="8419125" y="2910900"/>
-              <a:ext cx="304800" cy="280200"/>
-            </a:xfrm>
-            <a:prstGeom prst="straightConnector1">
-              <a:avLst/>
-            </a:prstGeom>
-            <a:noFill/>
-            <a:ln w="9525" cap="flat" cmpd="sng">
-              <a:solidFill>
-                <a:schemeClr val="accent6"/>
-              </a:solidFill>
-              <a:prstDash val="solid"/>
-              <a:round/>
-              <a:headEnd type="none" w="med" len="med"/>
-              <a:tailEnd type="none" w="med" len="med"/>
-            </a:ln>
-          </p:spPr>
-        </p:cxnSp>
-        <p:cxnSp>
-          <p:nvCxnSpPr>
-            <p:cNvPr id="1265" name="Google Shape;1265;p39"/>
-            <p:cNvCxnSpPr/>
-            <p:nvPr/>
-          </p:nvCxnSpPr>
-          <p:spPr>
-            <a:xfrm>
-              <a:off x="8424000" y="4622675"/>
-              <a:ext cx="299100" cy="278700"/>
-            </a:xfrm>
-            <a:prstGeom prst="straightConnector1">
-              <a:avLst/>
-            </a:prstGeom>
-            <a:noFill/>
-            <a:ln w="9525" cap="flat" cmpd="sng">
-              <a:solidFill>
-                <a:schemeClr val="accent6"/>
-              </a:solidFill>
-              <a:prstDash val="solid"/>
-              <a:round/>
-              <a:headEnd type="none" w="med" len="med"/>
-              <a:tailEnd type="none" w="med" len="med"/>
-            </a:ln>
-          </p:spPr>
-        </p:cxnSp>
-      </p:grpSp>
-      <p:pic>
-        <p:nvPicPr>
-          <p:cNvPr id="1266" name="Google Shape;1266;p39"/>
-          <p:cNvPicPr preferRelativeResize="0"/>
-          <p:nvPr/>
-        </p:nvPicPr>
-        <p:blipFill rotWithShape="1">
-          <a:blip r:embed="rId3">
-            <a:alphaModFix/>
-          </a:blip>
-          <a:srcRect l="7848" r="7848"/>
-          <a:stretch/>
-        </p:blipFill>
-        <p:spPr>
-          <a:xfrm>
-            <a:off x="3851352" y="3853513"/>
-            <a:ext cx="3567744" cy="2380499"/>
-          </a:xfrm>
-          <a:prstGeom prst="rect">
-            <a:avLst/>
-          </a:prstGeom>
-          <a:noFill/>
-          <a:ln>
-            <a:noFill/>
-          </a:ln>
-        </p:spPr>
-      </p:pic>
       <p:sp>
         <p:nvSpPr>
           <p:cNvPr id="1267" name="Google Shape;1267;p39"/>
@@ -52141,7 +51901,7 @@
       <p:sp>
         <p:nvSpPr>
           <p:cNvPr id="1268" name="Google Shape;1268;p39">
-            <a:hlinkClick r:id="rId4" action="ppaction://hlinksldjump"/>
+            <a:hlinkClick r:id="rId3" action="ppaction://hlinksldjump"/>
           </p:cNvPr>
           <p:cNvSpPr txBox="1">
             <a:spLocks noGrp="1"/>
@@ -52175,17 +51935,17 @@
               <a:buNone/>
             </a:pPr>
             <a:r>
-              <a:rPr lang="en"/>
+              <a:rPr lang="en" dirty="0"/>
               <a:t>Introduction</a:t>
             </a:r>
-            <a:endParaRPr/>
+            <a:endParaRPr dirty="0"/>
           </a:p>
         </p:txBody>
       </p:sp>
       <p:sp>
         <p:nvSpPr>
           <p:cNvPr id="1269" name="Google Shape;1269;p39">
-            <a:hlinkClick r:id="rId5" action="ppaction://hlinksldjump"/>
+            <a:hlinkClick r:id="rId4" action="ppaction://hlinksldjump"/>
           </p:cNvPr>
           <p:cNvSpPr txBox="1">
             <a:spLocks noGrp="1"/>
@@ -52263,10 +52023,10 @@
               <a:buNone/>
             </a:pPr>
             <a:r>
-              <a:rPr lang="en"/>
+              <a:rPr lang="en" dirty="0"/>
               <a:t>The Question</a:t>
             </a:r>
-            <a:endParaRPr/>
+            <a:endParaRPr dirty="0"/>
           </a:p>
         </p:txBody>
       </p:sp>
@@ -52307,10 +52067,10 @@
               <a:buNone/>
             </a:pPr>
             <a:r>
-              <a:rPr lang="en"/>
+              <a:rPr lang="en" dirty="0"/>
               <a:t>Why</a:t>
             </a:r>
-            <a:endParaRPr/>
+            <a:endParaRPr dirty="0"/>
           </a:p>
         </p:txBody>
       </p:sp>
@@ -52361,7 +52121,7 @@
       <p:sp>
         <p:nvSpPr>
           <p:cNvPr id="1273" name="Google Shape;1273;p39">
-            <a:hlinkClick r:id="rId4" action="ppaction://hlinksldjump"/>
+            <a:hlinkClick r:id="rId3" action="ppaction://hlinksldjump"/>
           </p:cNvPr>
           <p:cNvSpPr txBox="1">
             <a:spLocks noGrp="1"/>
@@ -52402,6 +52162,36 @@
           </a:p>
         </p:txBody>
       </p:sp>
+      <p:pic>
+        <p:nvPicPr>
+          <p:cNvPr id="6" name="Picture 5">
+            <a:extLst>
+              <a:ext uri="{FF2B5EF4-FFF2-40B4-BE49-F238E27FC236}">
+                <a16:creationId xmlns:a16="http://schemas.microsoft.com/office/drawing/2014/main" id="{B11A2E99-676F-B74E-9B17-DD575B04D069}"/>
+              </a:ext>
+            </a:extLst>
+          </p:cNvPr>
+          <p:cNvPicPr>
+            <a:picLocks noChangeAspect="1"/>
+          </p:cNvPicPr>
+          <p:nvPr/>
+        </p:nvPicPr>
+        <p:blipFill>
+          <a:blip r:embed="rId5"/>
+          <a:stretch>
+            <a:fillRect/>
+          </a:stretch>
+        </p:blipFill>
+        <p:spPr>
+          <a:xfrm>
+            <a:off x="771976" y="1600200"/>
+            <a:ext cx="6065662" cy="4975721"/>
+          </a:xfrm>
+          <a:prstGeom prst="rect">
+            <a:avLst/>
+          </a:prstGeom>
+        </p:spPr>
+      </p:pic>
     </p:spTree>
   </p:cSld>
   <p:clrMapOvr>

</xml_diff>